<commit_message>
Update 910529 Bebop 드론 Arduiplot 주행 프로그램 업로드.pptx
</commit_message>
<xml_diff>
--- a/104 자율비행 스터디/910529 Bebop 드론 Arduiplot 주행 프로그램 업로드.pptx
+++ b/104 자율비행 스터디/910529 Bebop 드론 Arduiplot 주행 프로그램 업로드.pptx
@@ -5,7 +5,7 @@
     <p:sldMasterId id="2147483660" r:id="rId1"/>
   </p:sldMasterIdLst>
   <p:notesMasterIdLst>
-    <p:notesMasterId r:id="rId19"/>
+    <p:notesMasterId r:id="rId20"/>
   </p:notesMasterIdLst>
   <p:sldIdLst>
     <p:sldId id="256" r:id="rId2"/>
@@ -23,8 +23,9 @@
     <p:sldId id="269" r:id="rId14"/>
     <p:sldId id="271" r:id="rId15"/>
     <p:sldId id="270" r:id="rId16"/>
-    <p:sldId id="274" r:id="rId17"/>
-    <p:sldId id="259" r:id="rId18"/>
+    <p:sldId id="275" r:id="rId17"/>
+    <p:sldId id="274" r:id="rId18"/>
+    <p:sldId id="259" r:id="rId19"/>
   </p:sldIdLst>
   <p:sldSz cx="9906000" cy="6858000" type="A4"/>
   <p:notesSz cx="6858000" cy="9144000"/>
@@ -444,7 +445,7 @@
           <a:p>
             <a:fld id="{60456C2F-1F67-44A5-80B0-9C3A6CA33C82}" type="datetimeFigureOut">
               <a:rPr lang="en-US" smtClean="0"/>
-              <a:t>6/3/2019</a:t>
+              <a:t>6/5/2019</a:t>
             </a:fld>
             <a:endParaRPr lang="en-US"/>
           </a:p>
@@ -843,7 +844,7 @@
           <a:p>
             <a:fld id="{B06DE1AE-4639-4348-B0F3-0167B6694DC9}" type="datetime1">
               <a:rPr lang="ko-KR" altLang="en-US" smtClean="0"/>
-              <a:t>2019-06-03</a:t>
+              <a:t>2019-06-05</a:t>
             </a:fld>
             <a:endParaRPr lang="en-US"/>
           </a:p>
@@ -1017,7 +1018,7 @@
           <a:p>
             <a:fld id="{0A6664A7-F427-4CE6-B4E0-68F20D477FC0}" type="datetime1">
               <a:rPr lang="ko-KR" altLang="en-US" smtClean="0"/>
-              <a:t>2019-06-03</a:t>
+              <a:t>2019-06-05</a:t>
             </a:fld>
             <a:endParaRPr lang="en-US"/>
           </a:p>
@@ -1353,7 +1354,7 @@
           <a:p>
             <a:fld id="{FA9B1944-E9AA-4CB3-A3C3-A27AE56A9BB7}" type="datetime1">
               <a:rPr lang="ko-KR" altLang="en-US" smtClean="0"/>
-              <a:t>2019-06-03</a:t>
+              <a:t>2019-06-05</a:t>
             </a:fld>
             <a:endParaRPr lang="en-US"/>
           </a:p>
@@ -1632,7 +1633,7 @@
           <a:p>
             <a:fld id="{99BD86E3-99A1-4169-B1C8-1A55721196C8}" type="datetime1">
               <a:rPr lang="ko-KR" altLang="en-US" smtClean="0"/>
-              <a:t>2019-06-03</a:t>
+              <a:t>2019-06-05</a:t>
             </a:fld>
             <a:endParaRPr lang="en-US"/>
           </a:p>
@@ -1948,7 +1949,7 @@
           <a:p>
             <a:fld id="{CE304F0F-8039-4A08-ADA5-D10D3A9B33DF}" type="datetime1">
               <a:rPr lang="ko-KR" altLang="en-US" smtClean="0"/>
-              <a:t>2019-06-03</a:t>
+              <a:t>2019-06-05</a:t>
             </a:fld>
             <a:endParaRPr lang="en-US"/>
           </a:p>
@@ -2362,7 +2363,7 @@
           <a:p>
             <a:fld id="{28866B29-90F0-4A08-89FB-620AA2F0F8D3}" type="datetime1">
               <a:rPr lang="ko-KR" altLang="en-US" smtClean="0"/>
-              <a:t>2019-06-03</a:t>
+              <a:t>2019-06-05</a:t>
             </a:fld>
             <a:endParaRPr lang="en-US"/>
           </a:p>
@@ -2484,7 +2485,7 @@
           <a:p>
             <a:fld id="{B9615DA9-78D4-48B3-9962-E7DA71CD6641}" type="datetime1">
               <a:rPr lang="ko-KR" altLang="en-US" smtClean="0"/>
-              <a:t>2019-06-03</a:t>
+              <a:t>2019-06-05</a:t>
             </a:fld>
             <a:endParaRPr lang="en-US"/>
           </a:p>
@@ -2631,7 +2632,7 @@
           <a:p>
             <a:fld id="{9DE34919-3FD6-4B5C-A4D1-EEDC57DC61BF}" type="datetime1">
               <a:rPr lang="ko-KR" altLang="en-US" smtClean="0"/>
-              <a:t>2019-06-03</a:t>
+              <a:t>2019-06-05</a:t>
             </a:fld>
             <a:endParaRPr lang="en-US"/>
           </a:p>
@@ -2850,7 +2851,7 @@
           <a:p>
             <a:fld id="{1A5DDEA1-2698-4E9D-9D16-4796BB1B4EE7}" type="datetime1">
               <a:rPr lang="ko-KR" altLang="en-US" smtClean="0"/>
-              <a:t>2019-06-03</a:t>
+              <a:t>2019-06-05</a:t>
             </a:fld>
             <a:endParaRPr lang="en-US"/>
           </a:p>
@@ -3597,7 +3598,7 @@
           <a:p>
             <a:fld id="{0A6664A7-F427-4CE6-B4E0-68F20D477FC0}" type="datetime1">
               <a:rPr lang="ko-KR" altLang="en-US" smtClean="0"/>
-              <a:t>2019-06-03</a:t>
+              <a:t>2019-06-05</a:t>
             </a:fld>
             <a:endParaRPr lang="en-US"/>
           </a:p>
@@ -3907,7 +3908,7 @@
           <a:p>
             <a:fld id="{0A6664A7-F427-4CE6-B4E0-68F20D477FC0}" type="datetime1">
               <a:rPr lang="ko-KR" altLang="en-US" smtClean="0"/>
-              <a:t>2019-06-03</a:t>
+              <a:t>2019-06-05</a:t>
             </a:fld>
             <a:endParaRPr lang="en-US"/>
           </a:p>
@@ -4037,7 +4038,7 @@
           <a:p>
             <a:fld id="{0A6664A7-F427-4CE6-B4E0-68F20D477FC0}" type="datetime1">
               <a:rPr lang="ko-KR" altLang="en-US" smtClean="0"/>
-              <a:t>2019-06-03</a:t>
+              <a:t>2019-06-05</a:t>
             </a:fld>
             <a:endParaRPr lang="en-US"/>
           </a:p>
@@ -4269,7 +4270,7 @@
           <a:p>
             <a:fld id="{0A6664A7-F427-4CE6-B4E0-68F20D477FC0}" type="datetime1">
               <a:rPr lang="ko-KR" altLang="en-US" smtClean="0"/>
-              <a:t>2019-06-03</a:t>
+              <a:t>2019-06-05</a:t>
             </a:fld>
             <a:endParaRPr lang="en-US"/>
           </a:p>
@@ -4576,7 +4577,7 @@
           <a:p>
             <a:fld id="{0A6664A7-F427-4CE6-B4E0-68F20D477FC0}" type="datetime1">
               <a:rPr lang="ko-KR" altLang="en-US" smtClean="0"/>
-              <a:t>2019-06-03</a:t>
+              <a:t>2019-06-05</a:t>
             </a:fld>
             <a:endParaRPr lang="en-US"/>
           </a:p>
@@ -4902,7 +4903,7 @@
           <a:p>
             <a:fld id="{0A6664A7-F427-4CE6-B4E0-68F20D477FC0}" type="datetime1">
               <a:rPr lang="ko-KR" altLang="en-US" smtClean="0"/>
-              <a:t>2019-06-03</a:t>
+              <a:t>2019-06-05</a:t>
             </a:fld>
             <a:endParaRPr lang="en-US"/>
           </a:p>
@@ -4996,6 +4997,161 @@
         </p:nvSpPr>
         <p:spPr/>
         <p:txBody>
+          <a:bodyPr>
+            <a:normAutofit fontScale="90000"/>
+          </a:bodyPr>
+          <a:lstStyle/>
+          <a:p>
+            <a:r>
+              <a:rPr lang="en-US" altLang="ko-KR" smtClean="0"/>
+              <a:t>Bebop 2 ArduPilot </a:t>
+            </a:r>
+            <a:r>
+              <a:rPr lang="ko-KR" altLang="en-US" smtClean="0"/>
+              <a:t>캘리브레이션 방법</a:t>
+            </a:r>
+            <a:endParaRPr lang="en-US"/>
+          </a:p>
+        </p:txBody>
+      </p:sp>
+      <p:sp>
+        <p:nvSpPr>
+          <p:cNvPr id="4" name="날짜 개체 틀 3"/>
+          <p:cNvSpPr>
+            <a:spLocks noGrp="1"/>
+          </p:cNvSpPr>
+          <p:nvPr>
+            <p:ph type="dt" sz="half" idx="10"/>
+          </p:nvPr>
+        </p:nvSpPr>
+        <p:spPr/>
+        <p:txBody>
+          <a:bodyPr/>
+          <a:lstStyle/>
+          <a:p>
+            <a:fld id="{0A6664A7-F427-4CE6-B4E0-68F20D477FC0}" type="datetime1">
+              <a:rPr lang="ko-KR" altLang="en-US" smtClean="0"/>
+              <a:t>2019-06-05</a:t>
+            </a:fld>
+            <a:endParaRPr lang="en-US"/>
+          </a:p>
+        </p:txBody>
+      </p:sp>
+      <p:sp>
+        <p:nvSpPr>
+          <p:cNvPr id="5" name="바닥글 개체 틀 4"/>
+          <p:cNvSpPr>
+            <a:spLocks noGrp="1"/>
+          </p:cNvSpPr>
+          <p:nvPr>
+            <p:ph type="ftr" sz="quarter" idx="11"/>
+          </p:nvPr>
+        </p:nvSpPr>
+        <p:spPr/>
+        <p:txBody>
+          <a:bodyPr/>
+          <a:lstStyle/>
+          <a:p>
+            <a:r>
+              <a:rPr lang="ko-KR" altLang="en-US" smtClean="0"/>
+              <a:t>자율비행 스터디 일정</a:t>
+            </a:r>
+            <a:endParaRPr lang="en-US"/>
+          </a:p>
+        </p:txBody>
+      </p:sp>
+      <p:sp>
+        <p:nvSpPr>
+          <p:cNvPr id="6" name="슬라이드 번호 개체 틀 5"/>
+          <p:cNvSpPr>
+            <a:spLocks noGrp="1"/>
+          </p:cNvSpPr>
+          <p:nvPr>
+            <p:ph type="sldNum" sz="quarter" idx="12"/>
+          </p:nvPr>
+        </p:nvSpPr>
+        <p:spPr/>
+        <p:txBody>
+          <a:bodyPr/>
+          <a:lstStyle/>
+          <a:p>
+            <a:fld id="{AA0EB1BB-D2B3-481B-A5E1-F093F8D3CD29}" type="slidenum">
+              <a:rPr lang="en-US" smtClean="0"/>
+              <a:t>16</a:t>
+            </a:fld>
+            <a:endParaRPr lang="en-US"/>
+          </a:p>
+        </p:txBody>
+      </p:sp>
+      <p:sp>
+        <p:nvSpPr>
+          <p:cNvPr id="7" name="내용 개체 틀 6"/>
+          <p:cNvSpPr>
+            <a:spLocks noGrp="1"/>
+          </p:cNvSpPr>
+          <p:nvPr>
+            <p:ph idx="1"/>
+          </p:nvPr>
+        </p:nvSpPr>
+        <p:spPr/>
+        <p:txBody>
+          <a:bodyPr>
+            <a:normAutofit/>
+          </a:bodyPr>
+          <a:lstStyle/>
+          <a:p>
+            <a:r>
+              <a:rPr lang="en-US" sz="3000">
+                <a:hlinkClick r:id="rId2"/>
+              </a:rPr>
+              <a:t>https://www.youtube.com/watch?v=Ir0DyvlbTM0</a:t>
+            </a:r>
+            <a:endParaRPr lang="en-US" sz="3000"/>
+          </a:p>
+        </p:txBody>
+      </p:sp>
+    </p:spTree>
+    <p:extLst>
+      <p:ext uri="{BB962C8B-B14F-4D97-AF65-F5344CB8AC3E}">
+        <p14:creationId xmlns:p14="http://schemas.microsoft.com/office/powerpoint/2010/main" val="3928152115"/>
+      </p:ext>
+    </p:extLst>
+  </p:cSld>
+  <p:clrMapOvr>
+    <a:masterClrMapping/>
+  </p:clrMapOvr>
+</p:sld>
+</file>
+
+<file path=ppt/slides/slide17.xml><?xml version="1.0" encoding="utf-8"?>
+<p:sld xmlns:a="http://schemas.openxmlformats.org/drawingml/2006/main" xmlns:r="http://schemas.openxmlformats.org/officeDocument/2006/relationships" xmlns:p="http://schemas.openxmlformats.org/presentationml/2006/main">
+  <p:cSld>
+    <p:spTree>
+      <p:nvGrpSpPr>
+        <p:cNvPr id="1" name=""/>
+        <p:cNvGrpSpPr/>
+        <p:nvPr/>
+      </p:nvGrpSpPr>
+      <p:grpSpPr>
+        <a:xfrm>
+          <a:off x="0" y="0"/>
+          <a:ext cx="0" cy="0"/>
+          <a:chOff x="0" y="0"/>
+          <a:chExt cx="0" cy="0"/>
+        </a:xfrm>
+      </p:grpSpPr>
+      <p:sp>
+        <p:nvSpPr>
+          <p:cNvPr id="2" name="제목 1"/>
+          <p:cNvSpPr>
+            <a:spLocks noGrp="1"/>
+          </p:cNvSpPr>
+          <p:nvPr>
+            <p:ph type="title"/>
+          </p:nvPr>
+        </p:nvSpPr>
+        <p:spPr/>
+        <p:txBody>
           <a:bodyPr/>
           <a:lstStyle/>
           <a:p>
@@ -5054,7 +5210,7 @@
           <a:p>
             <a:fld id="{0A6664A7-F427-4CE6-B4E0-68F20D477FC0}" type="datetime1">
               <a:rPr lang="ko-KR" altLang="en-US" smtClean="0"/>
-              <a:t>2019-06-03</a:t>
+              <a:t>2019-06-05</a:t>
             </a:fld>
             <a:endParaRPr lang="en-US"/>
           </a:p>
@@ -5100,7 +5256,7 @@
           <a:p>
             <a:fld id="{AA0EB1BB-D2B3-481B-A5E1-F093F8D3CD29}" type="slidenum">
               <a:rPr lang="en-US" smtClean="0"/>
-              <a:t>16</a:t>
+              <a:t>17</a:t>
             </a:fld>
             <a:endParaRPr lang="en-US"/>
           </a:p>
@@ -5143,7 +5299,7 @@
 </p:sld>
 </file>
 
-<file path=ppt/slides/slide17.xml><?xml version="1.0" encoding="utf-8"?>
+<file path=ppt/slides/slide18.xml><?xml version="1.0" encoding="utf-8"?>
 <p:sld xmlns:a="http://schemas.openxmlformats.org/drawingml/2006/main" xmlns:r="http://schemas.openxmlformats.org/officeDocument/2006/relationships" xmlns:p="http://schemas.openxmlformats.org/presentationml/2006/main">
   <p:cSld>
     <p:spTree>
@@ -5210,7 +5366,7 @@
           <a:p>
             <a:fld id="{AA0EB1BB-D2B3-481B-A5E1-F093F8D3CD29}" type="slidenum">
               <a:rPr lang="en-US" smtClean="0"/>
-              <a:t>17</a:t>
+              <a:t>18</a:t>
             </a:fld>
             <a:endParaRPr lang="en-US"/>
           </a:p>
@@ -5233,7 +5389,7 @@
           <a:p>
             <a:fld id="{7499096A-FB80-4DFA-8377-57081A574AA4}" type="datetime1">
               <a:rPr lang="ko-KR" altLang="en-US" smtClean="0"/>
-              <a:t>2019-06-03</a:t>
+              <a:t>2019-06-05</a:t>
             </a:fld>
             <a:endParaRPr lang="en-US"/>
           </a:p>
@@ -5430,7 +5586,7 @@
           <a:p>
             <a:fld id="{0A6664A7-F427-4CE6-B4E0-68F20D477FC0}" type="datetime1">
               <a:rPr lang="ko-KR" altLang="en-US" smtClean="0"/>
-              <a:t>2019-06-03</a:t>
+              <a:t>2019-06-05</a:t>
             </a:fld>
             <a:endParaRPr lang="en-US"/>
           </a:p>
@@ -5669,7 +5825,7 @@
           <a:p>
             <a:fld id="{0A6664A7-F427-4CE6-B4E0-68F20D477FC0}" type="datetime1">
               <a:rPr lang="ko-KR" altLang="en-US" smtClean="0"/>
-              <a:t>2019-06-03</a:t>
+              <a:t>2019-06-05</a:t>
             </a:fld>
             <a:endParaRPr lang="en-US"/>
           </a:p>
@@ -5959,7 +6115,7 @@
           <a:p>
             <a:fld id="{0A6664A7-F427-4CE6-B4E0-68F20D477FC0}" type="datetime1">
               <a:rPr lang="ko-KR" altLang="en-US" smtClean="0"/>
-              <a:t>2019-06-03</a:t>
+              <a:t>2019-06-05</a:t>
             </a:fld>
             <a:endParaRPr lang="en-US"/>
           </a:p>
@@ -6269,7 +6425,7 @@
           <a:p>
             <a:fld id="{0A6664A7-F427-4CE6-B4E0-68F20D477FC0}" type="datetime1">
               <a:rPr lang="ko-KR" altLang="en-US" smtClean="0"/>
-              <a:t>2019-06-03</a:t>
+              <a:t>2019-06-05</a:t>
             </a:fld>
             <a:endParaRPr lang="en-US"/>
           </a:p>
@@ -6464,7 +6620,7 @@
           <a:p>
             <a:fld id="{0A6664A7-F427-4CE6-B4E0-68F20D477FC0}" type="datetime1">
               <a:rPr lang="ko-KR" altLang="en-US" smtClean="0"/>
-              <a:t>2019-06-03</a:t>
+              <a:t>2019-06-05</a:t>
             </a:fld>
             <a:endParaRPr lang="en-US"/>
           </a:p>
@@ -6663,7 +6819,7 @@
           <a:p>
             <a:fld id="{0A6664A7-F427-4CE6-B4E0-68F20D477FC0}" type="datetime1">
               <a:rPr lang="ko-KR" altLang="en-US" smtClean="0"/>
-              <a:t>2019-06-03</a:t>
+              <a:t>2019-06-05</a:t>
             </a:fld>
             <a:endParaRPr lang="en-US"/>
           </a:p>
@@ -6937,7 +7093,7 @@
           <a:p>
             <a:fld id="{0A6664A7-F427-4CE6-B4E0-68F20D477FC0}" type="datetime1">
               <a:rPr lang="ko-KR" altLang="en-US" smtClean="0"/>
-              <a:t>2019-06-03</a:t>
+              <a:t>2019-06-05</a:t>
             </a:fld>
             <a:endParaRPr lang="en-US"/>
           </a:p>
@@ -7133,7 +7289,7 @@
           <a:p>
             <a:fld id="{0A6664A7-F427-4CE6-B4E0-68F20D477FC0}" type="datetime1">
               <a:rPr lang="ko-KR" altLang="en-US" smtClean="0"/>
-              <a:t>2019-06-03</a:t>
+              <a:t>2019-06-05</a:t>
             </a:fld>
             <a:endParaRPr lang="en-US"/>
           </a:p>

</xml_diff>